<commit_message>
Documentação completa da Sprint 6
</commit_message>
<xml_diff>
--- a/Sprint 6/Artefatos_Sprint6.pptx
+++ b/Sprint 6/Artefatos_Sprint6.pptx
@@ -114,532 +114,6 @@
     </p:ext>
   </p:extLst>
 </p:presentation>
-</file>
-
-<file path=ppt/charts/chart1.xml><?xml version="1.0" encoding="utf-8"?>
-<c:chartSpace xmlns:c="http://schemas.openxmlformats.org/drawingml/2006/chart" xmlns:a="http://schemas.openxmlformats.org/drawingml/2006/main" xmlns:r="http://schemas.openxmlformats.org/officeDocument/2006/relationships">
-  <c:date1904 val="0"/>
-  <c:lang val="pt-BR"/>
-  <c:roundedCorners val="0"/>
-  <mc:AlternateContent xmlns:mc="http://schemas.openxmlformats.org/markup-compatibility/2006">
-    <mc:Choice xmlns:c14="http://schemas.microsoft.com/office/drawing/2007/8/2/chart" Requires="c14">
-      <c14:style val="102"/>
-    </mc:Choice>
-    <mc:Fallback>
-      <c:style val="2"/>
-    </mc:Fallback>
-  </mc:AlternateContent>
-  <c:chart>
-    <c:autoTitleDeleted val="1"/>
-    <c:plotArea>
-      <c:layout>
-        <c:manualLayout>
-          <c:layoutTarget val="inner"/>
-          <c:xMode val="edge"/>
-          <c:yMode val="edge"/>
-          <c:x val="4.673138119918957E-2"/>
-          <c:y val="6.1475515806925098E-2"/>
-          <c:w val="0.89081655516788805"/>
-          <c:h val="0.61901206918004203"/>
-        </c:manualLayout>
-      </c:layout>
-      <c:lineChart>
-        <c:grouping val="standard"/>
-        <c:varyColors val="1"/>
-        <c:ser>
-          <c:idx val="0"/>
-          <c:order val="0"/>
-          <c:tx>
-            <c:strRef>
-              <c:f>'Sprint Burndown'!$A$5</c:f>
-              <c:strCache>
-                <c:ptCount val="1"/>
-                <c:pt idx="0">
-                  <c:v>Ideal</c:v>
-                </c:pt>
-              </c:strCache>
-            </c:strRef>
-          </c:tx>
-          <c:spPr>
-            <a:ln w="25560">
-              <a:solidFill>
-                <a:srgbClr val="DC3912"/>
-              </a:solidFill>
-              <a:round/>
-            </a:ln>
-          </c:spPr>
-          <c:marker>
-            <c:symbol val="none"/>
-          </c:marker>
-          <c:dLbls>
-            <c:spPr>
-              <a:noFill/>
-              <a:ln>
-                <a:noFill/>
-              </a:ln>
-              <a:effectLst/>
-            </c:spPr>
-            <c:dLblPos val="r"/>
-            <c:showLegendKey val="0"/>
-            <c:showVal val="0"/>
-            <c:showCatName val="0"/>
-            <c:showSerName val="0"/>
-            <c:showPercent val="0"/>
-            <c:showBubbleSize val="1"/>
-            <c:showLeaderLines val="0"/>
-            <c:extLst xmlns:c16r2="http://schemas.microsoft.com/office/drawing/2015/06/chart">
-              <c:ext xmlns:c15="http://schemas.microsoft.com/office/drawing/2012/chart" uri="{CE6537A1-D6FC-4f65-9D91-7224C49458BB}">
-                <c15:showLeaderLines val="0"/>
-              </c:ext>
-            </c:extLst>
-          </c:dLbls>
-          <c:cat>
-            <c:strRef>
-              <c:f>'Sprint Burndown'!$B$3:$J$3</c:f>
-              <c:strCache>
-                <c:ptCount val="9"/>
-                <c:pt idx="0">
-                  <c:v>(hrs)</c:v>
-                </c:pt>
-                <c:pt idx="1">
-                  <c:v>Terça
-04/10/2016</c:v>
-                </c:pt>
-                <c:pt idx="2">
-                  <c:v>Quarta
-05/10/2016</c:v>
-                </c:pt>
-                <c:pt idx="3">
-                  <c:v>Quinta
-06/10/2016</c:v>
-                </c:pt>
-                <c:pt idx="4">
-                  <c:v>Sexta
-07/10/2016</c:v>
-                </c:pt>
-                <c:pt idx="5">
-                  <c:v>Sábado
-08/10/2016</c:v>
-                </c:pt>
-                <c:pt idx="6">
-                  <c:v>Domingo
-09/10/2016</c:v>
-                </c:pt>
-                <c:pt idx="7">
-                  <c:v>Segunda
-10/10/2016</c:v>
-                </c:pt>
-                <c:pt idx="8">
-                  <c:v>Terça
-11/10/2016</c:v>
-                </c:pt>
-              </c:strCache>
-            </c:strRef>
-          </c:cat>
-          <c:val>
-            <c:numRef>
-              <c:f>'Sprint Burndown'!$B$5:$J$5</c:f>
-              <c:numCache>
-                <c:formatCode>#,##0.00</c:formatCode>
-                <c:ptCount val="9"/>
-                <c:pt idx="0" formatCode="General">
-                  <c:v>32.930000000000007</c:v>
-                </c:pt>
-                <c:pt idx="1">
-                  <c:v>28.813750000000006</c:v>
-                </c:pt>
-                <c:pt idx="2">
-                  <c:v>24.697500000000005</c:v>
-                </c:pt>
-                <c:pt idx="3">
-                  <c:v>20.581250000000004</c:v>
-                </c:pt>
-                <c:pt idx="4">
-                  <c:v>16.465000000000003</c:v>
-                </c:pt>
-                <c:pt idx="5">
-                  <c:v>12.348750000000003</c:v>
-                </c:pt>
-                <c:pt idx="6">
-                  <c:v>8.2325000000000017</c:v>
-                </c:pt>
-                <c:pt idx="7">
-                  <c:v>4.1162500000000009</c:v>
-                </c:pt>
-                <c:pt idx="8">
-                  <c:v>0</c:v>
-                </c:pt>
-              </c:numCache>
-            </c:numRef>
-          </c:val>
-          <c:smooth val="0"/>
-          <c:extLst xmlns:c16r2="http://schemas.microsoft.com/office/drawing/2015/06/chart">
-            <c:ext xmlns:c16="http://schemas.microsoft.com/office/drawing/2014/chart" uri="{C3380CC4-5D6E-409C-BE32-E72D297353CC}">
-              <c16:uniqueId val="{00000000-DA66-4EF5-9460-31F9FFB35621}"/>
-            </c:ext>
-          </c:extLst>
-        </c:ser>
-        <c:ser>
-          <c:idx val="1"/>
-          <c:order val="1"/>
-          <c:tx>
-            <c:strRef>
-              <c:f>'Sprint Burndown'!$A$6</c:f>
-              <c:strCache>
-                <c:ptCount val="1"/>
-                <c:pt idx="0">
-                  <c:v>Real</c:v>
-                </c:pt>
-              </c:strCache>
-            </c:strRef>
-          </c:tx>
-          <c:spPr>
-            <a:ln w="25560">
-              <a:solidFill>
-                <a:srgbClr val="FF9900"/>
-              </a:solidFill>
-              <a:round/>
-            </a:ln>
-          </c:spPr>
-          <c:marker>
-            <c:symbol val="none"/>
-          </c:marker>
-          <c:dLbls>
-            <c:spPr>
-              <a:noFill/>
-              <a:ln>
-                <a:noFill/>
-              </a:ln>
-              <a:effectLst/>
-            </c:spPr>
-            <c:dLblPos val="r"/>
-            <c:showLegendKey val="0"/>
-            <c:showVal val="0"/>
-            <c:showCatName val="0"/>
-            <c:showSerName val="0"/>
-            <c:showPercent val="0"/>
-            <c:showBubbleSize val="1"/>
-            <c:showLeaderLines val="0"/>
-            <c:extLst xmlns:c16r2="http://schemas.microsoft.com/office/drawing/2015/06/chart">
-              <c:ext xmlns:c15="http://schemas.microsoft.com/office/drawing/2012/chart" uri="{CE6537A1-D6FC-4f65-9D91-7224C49458BB}">
-                <c15:showLeaderLines val="0"/>
-              </c:ext>
-            </c:extLst>
-          </c:dLbls>
-          <c:cat>
-            <c:strRef>
-              <c:f>'Sprint Burndown'!$B$3:$J$3</c:f>
-              <c:strCache>
-                <c:ptCount val="9"/>
-                <c:pt idx="0">
-                  <c:v>(hrs)</c:v>
-                </c:pt>
-                <c:pt idx="1">
-                  <c:v>Terça
-04/10/2016</c:v>
-                </c:pt>
-                <c:pt idx="2">
-                  <c:v>Quarta
-05/10/2016</c:v>
-                </c:pt>
-                <c:pt idx="3">
-                  <c:v>Quinta
-06/10/2016</c:v>
-                </c:pt>
-                <c:pt idx="4">
-                  <c:v>Sexta
-07/10/2016</c:v>
-                </c:pt>
-                <c:pt idx="5">
-                  <c:v>Sábado
-08/10/2016</c:v>
-                </c:pt>
-                <c:pt idx="6">
-                  <c:v>Domingo
-09/10/2016</c:v>
-                </c:pt>
-                <c:pt idx="7">
-                  <c:v>Segunda
-10/10/2016</c:v>
-                </c:pt>
-                <c:pt idx="8">
-                  <c:v>Terça
-11/10/2016</c:v>
-                </c:pt>
-              </c:strCache>
-            </c:strRef>
-          </c:cat>
-          <c:val>
-            <c:numRef>
-              <c:f>'Sprint Burndown'!$B$6:$J$6</c:f>
-              <c:numCache>
-                <c:formatCode>#,##0.00</c:formatCode>
-                <c:ptCount val="9"/>
-                <c:pt idx="0" formatCode="General">
-                  <c:v>32.930000000000007</c:v>
-                </c:pt>
-                <c:pt idx="1">
-                  <c:v>32.930000000000007</c:v>
-                </c:pt>
-                <c:pt idx="2">
-                  <c:v>23.300000000000008</c:v>
-                </c:pt>
-                <c:pt idx="3">
-                  <c:v>23.300000000000008</c:v>
-                </c:pt>
-                <c:pt idx="4">
-                  <c:v>23.300000000000008</c:v>
-                </c:pt>
-                <c:pt idx="5">
-                  <c:v>15.550000000000008</c:v>
-                </c:pt>
-                <c:pt idx="6">
-                  <c:v>2.7500000000000071</c:v>
-                </c:pt>
-                <c:pt idx="7">
-                  <c:v>2.7500000000000071</c:v>
-                </c:pt>
-                <c:pt idx="8">
-                  <c:v>7.1054273576010019E-15</c:v>
-                </c:pt>
-              </c:numCache>
-            </c:numRef>
-          </c:val>
-          <c:smooth val="0"/>
-          <c:extLst xmlns:c16r2="http://schemas.microsoft.com/office/drawing/2015/06/chart">
-            <c:ext xmlns:c16="http://schemas.microsoft.com/office/drawing/2014/chart" uri="{C3380CC4-5D6E-409C-BE32-E72D297353CC}">
-              <c16:uniqueId val="{00000001-DA66-4EF5-9460-31F9FFB35621}"/>
-            </c:ext>
-          </c:extLst>
-        </c:ser>
-        <c:dLbls>
-          <c:showLegendKey val="0"/>
-          <c:showVal val="0"/>
-          <c:showCatName val="0"/>
-          <c:showSerName val="0"/>
-          <c:showPercent val="0"/>
-          <c:showBubbleSize val="0"/>
-        </c:dLbls>
-        <c:hiLowLines>
-          <c:spPr>
-            <a:ln>
-              <a:noFill/>
-            </a:ln>
-          </c:spPr>
-        </c:hiLowLines>
-        <c:smooth val="0"/>
-        <c:axId val="144614232"/>
-        <c:axId val="147188720"/>
-      </c:lineChart>
-      <c:catAx>
-        <c:axId val="144614232"/>
-        <c:scaling>
-          <c:orientation val="minMax"/>
-        </c:scaling>
-        <c:delete val="0"/>
-        <c:axPos val="b"/>
-        <c:title>
-          <c:tx>
-            <c:rich>
-              <a:bodyPr rot="0"/>
-              <a:lstStyle/>
-              <a:p>
-                <a:pPr>
-                  <a:defRPr sz="1000" b="1" strike="noStrike" spc="-1">
-                    <a:solidFill>
-                      <a:srgbClr val="000000"/>
-                    </a:solidFill>
-                    <a:uFill>
-                      <a:solidFill>
-                        <a:srgbClr val="FFFFFF"/>
-                      </a:solidFill>
-                    </a:uFill>
-                    <a:latin typeface="Arial"/>
-                  </a:defRPr>
-                </a:pPr>
-                <a:r>
-                  <a:rPr lang="pt-BR" sz="1000" b="1" strike="noStrike" spc="-1">
-                    <a:solidFill>
-                      <a:srgbClr val="000000"/>
-                    </a:solidFill>
-                    <a:uFill>
-                      <a:solidFill>
-                        <a:srgbClr val="FFFFFF"/>
-                      </a:solidFill>
-                    </a:uFill>
-                    <a:latin typeface="Arial"/>
-                  </a:rPr>
-                  <a:t>DIAS</a:t>
-                </a:r>
-              </a:p>
-            </c:rich>
-          </c:tx>
-          <c:layout>
-            <c:manualLayout>
-              <c:xMode val="edge"/>
-              <c:yMode val="edge"/>
-              <c:x val="0.4600500373966665"/>
-              <c:y val="0.84921098461515077"/>
-            </c:manualLayout>
-          </c:layout>
-          <c:overlay val="0"/>
-        </c:title>
-        <c:numFmt formatCode="General" sourceLinked="1"/>
-        <c:majorTickMark val="cross"/>
-        <c:minorTickMark val="cross"/>
-        <c:tickLblPos val="nextTo"/>
-        <c:spPr>
-          <a:ln>
-            <a:noFill/>
-          </a:ln>
-        </c:spPr>
-        <c:txPr>
-          <a:bodyPr/>
-          <a:lstStyle/>
-          <a:p>
-            <a:pPr>
-              <a:defRPr sz="1000" b="0" strike="noStrike" spc="-1">
-                <a:solidFill>
-                  <a:srgbClr val="222222"/>
-                </a:solidFill>
-                <a:uFill>
-                  <a:solidFill>
-                    <a:srgbClr val="FFFFFF"/>
-                  </a:solidFill>
-                </a:uFill>
-                <a:latin typeface="Arial"/>
-              </a:defRPr>
-            </a:pPr>
-            <a:endParaRPr lang="pt-BR"/>
-          </a:p>
-        </c:txPr>
-        <c:crossAx val="147188720"/>
-        <c:crosses val="autoZero"/>
-        <c:auto val="1"/>
-        <c:lblAlgn val="ctr"/>
-        <c:lblOffset val="100"/>
-        <c:noMultiLvlLbl val="1"/>
-      </c:catAx>
-      <c:valAx>
-        <c:axId val="147188720"/>
-        <c:scaling>
-          <c:orientation val="minMax"/>
-        </c:scaling>
-        <c:delete val="0"/>
-        <c:axPos val="l"/>
-        <c:majorGridlines>
-          <c:spPr>
-            <a:ln>
-              <a:solidFill>
-                <a:srgbClr val="B7B7B7"/>
-              </a:solidFill>
-            </a:ln>
-          </c:spPr>
-        </c:majorGridlines>
-        <c:title>
-          <c:tx>
-            <c:rich>
-              <a:bodyPr rot="-5400000"/>
-              <a:lstStyle/>
-              <a:p>
-                <a:pPr>
-                  <a:defRPr sz="1000" b="1" strike="noStrike" spc="-1">
-                    <a:solidFill>
-                      <a:srgbClr val="000000"/>
-                    </a:solidFill>
-                    <a:uFill>
-                      <a:solidFill>
-                        <a:srgbClr val="FFFFFF"/>
-                      </a:solidFill>
-                    </a:uFill>
-                    <a:latin typeface="Arial"/>
-                  </a:defRPr>
-                </a:pPr>
-                <a:r>
-                  <a:rPr lang="pt-BR" sz="1000" b="1" strike="noStrike" spc="-1">
-                    <a:solidFill>
-                      <a:srgbClr val="000000"/>
-                    </a:solidFill>
-                    <a:uFill>
-                      <a:solidFill>
-                        <a:srgbClr val="FFFFFF"/>
-                      </a:solidFill>
-                    </a:uFill>
-                    <a:latin typeface="Arial"/>
-                  </a:rPr>
-                  <a:t>TEMPO EM HORAS</a:t>
-                </a:r>
-              </a:p>
-            </c:rich>
-          </c:tx>
-          <c:layout/>
-          <c:overlay val="0"/>
-        </c:title>
-        <c:numFmt formatCode="General" sourceLinked="0"/>
-        <c:majorTickMark val="cross"/>
-        <c:minorTickMark val="cross"/>
-        <c:tickLblPos val="nextTo"/>
-        <c:spPr>
-          <a:ln w="47520">
-            <a:noFill/>
-          </a:ln>
-        </c:spPr>
-        <c:txPr>
-          <a:bodyPr/>
-          <a:lstStyle/>
-          <a:p>
-            <a:pPr>
-              <a:defRPr sz="1000" b="0" strike="noStrike" spc="-1">
-                <a:solidFill>
-                  <a:srgbClr val="000000"/>
-                </a:solidFill>
-                <a:uFill>
-                  <a:solidFill>
-                    <a:srgbClr val="FFFFFF"/>
-                  </a:solidFill>
-                </a:uFill>
-                <a:latin typeface="Arial"/>
-              </a:defRPr>
-            </a:pPr>
-            <a:endParaRPr lang="pt-BR"/>
-          </a:p>
-        </c:txPr>
-        <c:crossAx val="144614232"/>
-        <c:crosses val="autoZero"/>
-        <c:crossBetween val="midCat"/>
-      </c:valAx>
-      <c:spPr>
-        <a:noFill/>
-        <a:ln>
-          <a:noFill/>
-        </a:ln>
-      </c:spPr>
-    </c:plotArea>
-    <c:legend>
-      <c:legendPos val="r"/>
-      <c:layout/>
-      <c:overlay val="0"/>
-      <c:spPr>
-        <a:noFill/>
-        <a:ln>
-          <a:noFill/>
-        </a:ln>
-      </c:spPr>
-    </c:legend>
-    <c:plotVisOnly val="1"/>
-    <c:dispBlanksAs val="gap"/>
-    <c:showDLblsOverMax val="1"/>
-  </c:chart>
-  <c:spPr>
-    <a:noFill/>
-    <a:ln>
-      <a:noFill/>
-    </a:ln>
-  </c:spPr>
-  <c:externalData r:id="rId1">
-    <c:autoUpdate val="0"/>
-  </c:externalData>
-</c:chartSpace>
 </file>
 
 <file path=ppt/slideLayouts/slideLayout1.xml><?xml version="1.0" encoding="utf-8"?>
@@ -5297,7 +4771,7 @@
       </p:sp>
       <p:pic>
         <p:nvPicPr>
-          <p:cNvPr id="2" name="Imagem 1"/>
+          <p:cNvPr id="3" name="Imagem 2"/>
           <p:cNvPicPr>
             <a:picLocks noChangeAspect="1"/>
           </p:cNvPicPr>
@@ -5311,8 +4785,8 @@
         </p:blipFill>
         <p:spPr>
           <a:xfrm>
-            <a:off x="1" y="1190847"/>
-            <a:ext cx="9144000" cy="3753293"/>
+            <a:off x="0" y="1158950"/>
+            <a:ext cx="9143999" cy="3984550"/>
           </a:xfrm>
           <a:prstGeom prst="rect">
             <a:avLst/>
@@ -5431,7 +4905,7 @@
       </p:sp>
       <p:pic>
         <p:nvPicPr>
-          <p:cNvPr id="2" name="Imagem 1"/>
+          <p:cNvPr id="3" name="Imagem 2"/>
           <p:cNvPicPr>
             <a:picLocks noChangeAspect="1"/>
           </p:cNvPicPr>
@@ -5445,8 +4919,8 @@
         </p:blipFill>
         <p:spPr>
           <a:xfrm>
-            <a:off x="1" y="1210192"/>
-            <a:ext cx="9144000" cy="3594985"/>
+            <a:off x="0" y="1148141"/>
+            <a:ext cx="9144000" cy="3995359"/>
           </a:xfrm>
           <a:prstGeom prst="rect">
             <a:avLst/>
@@ -5562,30 +5036,30 @@
           </a:p>
         </p:txBody>
       </p:sp>
-      <p:graphicFrame>
-        <p:nvGraphicFramePr>
-          <p:cNvPr id="4" name="Chart 1"/>
-          <p:cNvGraphicFramePr>
-            <a:graphicFrameLocks/>
-          </p:cNvGraphicFramePr>
-          <p:nvPr>
-            <p:extLst>
-              <p:ext uri="{D42A27DB-BD31-4B8C-83A1-F6EECF244321}">
-                <p14:modId xmlns:p14="http://schemas.microsoft.com/office/powerpoint/2010/main" val="1940577242"/>
-              </p:ext>
-            </p:extLst>
-          </p:nvPr>
-        </p:nvGraphicFramePr>
-        <p:xfrm>
-          <a:off x="71919" y="1256820"/>
-          <a:ext cx="9072081" cy="3886680"/>
-        </p:xfrm>
-        <a:graphic>
-          <a:graphicData uri="http://schemas.openxmlformats.org/drawingml/2006/chart">
-            <c:chart xmlns:c="http://schemas.openxmlformats.org/drawingml/2006/chart" xmlns:r="http://schemas.openxmlformats.org/officeDocument/2006/relationships" r:id="rId2"/>
-          </a:graphicData>
-        </a:graphic>
-      </p:graphicFrame>
+      <p:pic>
+        <p:nvPicPr>
+          <p:cNvPr id="2" name="Imagem 1"/>
+          <p:cNvPicPr>
+            <a:picLocks noChangeAspect="1"/>
+          </p:cNvPicPr>
+          <p:nvPr/>
+        </p:nvPicPr>
+        <p:blipFill>
+          <a:blip r:embed="rId2"/>
+          <a:stretch>
+            <a:fillRect/>
+          </a:stretch>
+        </p:blipFill>
+        <p:spPr>
+          <a:xfrm>
+            <a:off x="123110" y="1306271"/>
+            <a:ext cx="8897420" cy="3748615"/>
+          </a:xfrm>
+          <a:prstGeom prst="rect">
+            <a:avLst/>
+          </a:prstGeom>
+        </p:spPr>
+      </p:pic>
     </p:spTree>
   </p:cSld>
   <p:clrMapOvr>

</xml_diff>